<commit_message>
updated signs with colors
</commit_message>
<xml_diff>
--- a/mgen/signs/borden.pptx
+++ b/mgen/signs/borden.pptx
@@ -5,11 +5,13 @@
     <p:sldMasterId id="2147483648" r:id="rId1"/>
   </p:sldMasterIdLst>
   <p:notesMasterIdLst>
-    <p:notesMasterId r:id="rId4"/>
+    <p:notesMasterId r:id="rId6"/>
   </p:notesMasterIdLst>
   <p:sldIdLst>
     <p:sldId id="256" r:id="rId2"/>
     <p:sldId id="257" r:id="rId3"/>
+    <p:sldId id="258" r:id="rId4"/>
+    <p:sldId id="259" r:id="rId5"/>
   </p:sldIdLst>
   <p:sldSz cx="12192000" cy="6858000"/>
   <p:notesSz cx="6858000" cy="9144000"/>
@@ -198,7 +200,7 @@
           <a:p>
             <a:fld id="{B25E9106-3031-462E-82AE-AAE841DD1890}" type="datetimeFigureOut">
               <a:rPr lang="nl-NL" smtClean="0"/>
-              <a:t>11-8-2022</a:t>
+              <a:t>24-8-2022</a:t>
             </a:fld>
             <a:endParaRPr lang="nl-NL"/>
           </a:p>
@@ -550,6 +552,90 @@
 </p:notes>
 </file>
 
+<file path=ppt/notesSlides/notesSlide2.xml><?xml version="1.0" encoding="utf-8"?>
+<p:notes xmlns:a="http://schemas.openxmlformats.org/drawingml/2006/main" xmlns:r="http://schemas.openxmlformats.org/officeDocument/2006/relationships" xmlns:p="http://schemas.openxmlformats.org/presentationml/2006/main">
+  <p:cSld>
+    <p:spTree>
+      <p:nvGrpSpPr>
+        <p:cNvPr id="1" name=""/>
+        <p:cNvGrpSpPr/>
+        <p:nvPr/>
+      </p:nvGrpSpPr>
+      <p:grpSpPr>
+        <a:xfrm>
+          <a:off x="0" y="0"/>
+          <a:ext cx="0" cy="0"/>
+          <a:chOff x="0" y="0"/>
+          <a:chExt cx="0" cy="0"/>
+        </a:xfrm>
+      </p:grpSpPr>
+      <p:sp>
+        <p:nvSpPr>
+          <p:cNvPr id="2" name="Slide Image Placeholder 1"/>
+          <p:cNvSpPr>
+            <a:spLocks noGrp="1" noRot="1" noChangeAspect="1"/>
+          </p:cNvSpPr>
+          <p:nvPr>
+            <p:ph type="sldImg"/>
+          </p:nvPr>
+        </p:nvSpPr>
+        <p:spPr/>
+      </p:sp>
+      <p:sp>
+        <p:nvSpPr>
+          <p:cNvPr id="3" name="Notes Placeholder 2"/>
+          <p:cNvSpPr>
+            <a:spLocks noGrp="1"/>
+          </p:cNvSpPr>
+          <p:nvPr>
+            <p:ph type="body" idx="1"/>
+          </p:nvPr>
+        </p:nvSpPr>
+        <p:spPr/>
+        <p:txBody>
+          <a:bodyPr/>
+          <a:lstStyle/>
+          <a:p>
+            <a:endParaRPr lang="nl-NL"/>
+          </a:p>
+        </p:txBody>
+      </p:sp>
+      <p:sp>
+        <p:nvSpPr>
+          <p:cNvPr id="4" name="Slide Number Placeholder 3"/>
+          <p:cNvSpPr>
+            <a:spLocks noGrp="1"/>
+          </p:cNvSpPr>
+          <p:nvPr>
+            <p:ph type="sldNum" sz="quarter" idx="5"/>
+          </p:nvPr>
+        </p:nvSpPr>
+        <p:spPr/>
+        <p:txBody>
+          <a:bodyPr/>
+          <a:lstStyle/>
+          <a:p>
+            <a:fld id="{E3E7B5F2-6C1C-408E-A604-16DD587A7CF5}" type="slidenum">
+              <a:rPr lang="nl-NL" smtClean="0"/>
+              <a:t>3</a:t>
+            </a:fld>
+            <a:endParaRPr lang="nl-NL"/>
+          </a:p>
+        </p:txBody>
+      </p:sp>
+    </p:spTree>
+    <p:extLst>
+      <p:ext uri="{BB962C8B-B14F-4D97-AF65-F5344CB8AC3E}">
+        <p14:creationId xmlns:p14="http://schemas.microsoft.com/office/powerpoint/2010/main" val="225372864"/>
+      </p:ext>
+    </p:extLst>
+  </p:cSld>
+  <p:clrMapOvr>
+    <a:masterClrMapping/>
+  </p:clrMapOvr>
+</p:notes>
+</file>
+
 <file path=ppt/slideLayouts/slideLayout1.xml><?xml version="1.0" encoding="utf-8"?>
 <p:sldLayout xmlns:a="http://schemas.openxmlformats.org/drawingml/2006/main" xmlns:r="http://schemas.openxmlformats.org/officeDocument/2006/relationships" xmlns:p="http://schemas.openxmlformats.org/presentationml/2006/main" type="title" preserve="1">
   <p:cSld name="Title Slide">
@@ -699,7 +785,7 @@
           <a:p>
             <a:fld id="{C4C03295-0AB4-4C47-8703-CF9857901F3C}" type="datetimeFigureOut">
               <a:rPr lang="nl-NL" smtClean="0"/>
-              <a:t>11-8-2022</a:t>
+              <a:t>24-8-2022</a:t>
             </a:fld>
             <a:endParaRPr lang="nl-NL"/>
           </a:p>
@@ -899,7 +985,7 @@
           <a:p>
             <a:fld id="{C4C03295-0AB4-4C47-8703-CF9857901F3C}" type="datetimeFigureOut">
               <a:rPr lang="nl-NL" smtClean="0"/>
-              <a:t>11-8-2022</a:t>
+              <a:t>24-8-2022</a:t>
             </a:fld>
             <a:endParaRPr lang="nl-NL"/>
           </a:p>
@@ -1109,7 +1195,7 @@
           <a:p>
             <a:fld id="{C4C03295-0AB4-4C47-8703-CF9857901F3C}" type="datetimeFigureOut">
               <a:rPr lang="nl-NL" smtClean="0"/>
-              <a:t>11-8-2022</a:t>
+              <a:t>24-8-2022</a:t>
             </a:fld>
             <a:endParaRPr lang="nl-NL"/>
           </a:p>
@@ -1309,7 +1395,7 @@
           <a:p>
             <a:fld id="{C4C03295-0AB4-4C47-8703-CF9857901F3C}" type="datetimeFigureOut">
               <a:rPr lang="nl-NL" smtClean="0"/>
-              <a:t>11-8-2022</a:t>
+              <a:t>24-8-2022</a:t>
             </a:fld>
             <a:endParaRPr lang="nl-NL"/>
           </a:p>
@@ -1585,7 +1671,7 @@
           <a:p>
             <a:fld id="{C4C03295-0AB4-4C47-8703-CF9857901F3C}" type="datetimeFigureOut">
               <a:rPr lang="nl-NL" smtClean="0"/>
-              <a:t>11-8-2022</a:t>
+              <a:t>24-8-2022</a:t>
             </a:fld>
             <a:endParaRPr lang="nl-NL"/>
           </a:p>
@@ -1853,7 +1939,7 @@
           <a:p>
             <a:fld id="{C4C03295-0AB4-4C47-8703-CF9857901F3C}" type="datetimeFigureOut">
               <a:rPr lang="nl-NL" smtClean="0"/>
-              <a:t>11-8-2022</a:t>
+              <a:t>24-8-2022</a:t>
             </a:fld>
             <a:endParaRPr lang="nl-NL"/>
           </a:p>
@@ -2268,7 +2354,7 @@
           <a:p>
             <a:fld id="{C4C03295-0AB4-4C47-8703-CF9857901F3C}" type="datetimeFigureOut">
               <a:rPr lang="nl-NL" smtClean="0"/>
-              <a:t>11-8-2022</a:t>
+              <a:t>24-8-2022</a:t>
             </a:fld>
             <a:endParaRPr lang="nl-NL"/>
           </a:p>
@@ -2410,7 +2496,7 @@
           <a:p>
             <a:fld id="{C4C03295-0AB4-4C47-8703-CF9857901F3C}" type="datetimeFigureOut">
               <a:rPr lang="nl-NL" smtClean="0"/>
-              <a:t>11-8-2022</a:t>
+              <a:t>24-8-2022</a:t>
             </a:fld>
             <a:endParaRPr lang="nl-NL"/>
           </a:p>
@@ -2523,7 +2609,7 @@
           <a:p>
             <a:fld id="{C4C03295-0AB4-4C47-8703-CF9857901F3C}" type="datetimeFigureOut">
               <a:rPr lang="nl-NL" smtClean="0"/>
-              <a:t>11-8-2022</a:t>
+              <a:t>24-8-2022</a:t>
             </a:fld>
             <a:endParaRPr lang="nl-NL"/>
           </a:p>
@@ -2836,7 +2922,7 @@
           <a:p>
             <a:fld id="{C4C03295-0AB4-4C47-8703-CF9857901F3C}" type="datetimeFigureOut">
               <a:rPr lang="nl-NL" smtClean="0"/>
-              <a:t>11-8-2022</a:t>
+              <a:t>24-8-2022</a:t>
             </a:fld>
             <a:endParaRPr lang="nl-NL"/>
           </a:p>
@@ -3125,7 +3211,7 @@
           <a:p>
             <a:fld id="{C4C03295-0AB4-4C47-8703-CF9857901F3C}" type="datetimeFigureOut">
               <a:rPr lang="nl-NL" smtClean="0"/>
-              <a:t>11-8-2022</a:t>
+              <a:t>24-8-2022</a:t>
             </a:fld>
             <a:endParaRPr lang="nl-NL"/>
           </a:p>
@@ -3368,7 +3454,7 @@
           <a:p>
             <a:fld id="{C4C03295-0AB4-4C47-8703-CF9857901F3C}" type="datetimeFigureOut">
               <a:rPr lang="nl-NL" smtClean="0"/>
-              <a:t>11-8-2022</a:t>
+              <a:t>24-8-2022</a:t>
             </a:fld>
             <a:endParaRPr lang="nl-NL"/>
           </a:p>
@@ -5132,6 +5218,951 @@
     <p:extLst>
       <p:ext uri="{BB962C8B-B14F-4D97-AF65-F5344CB8AC3E}">
         <p14:creationId xmlns:p14="http://schemas.microsoft.com/office/powerpoint/2010/main" val="2876191998"/>
+      </p:ext>
+    </p:extLst>
+  </p:cSld>
+  <p:clrMapOvr>
+    <a:masterClrMapping/>
+  </p:clrMapOvr>
+</p:sld>
+</file>
+
+<file path=ppt/slides/slide3.xml><?xml version="1.0" encoding="utf-8"?>
+<p:sld xmlns:a="http://schemas.openxmlformats.org/drawingml/2006/main" xmlns:r="http://schemas.openxmlformats.org/officeDocument/2006/relationships" xmlns:p="http://schemas.openxmlformats.org/presentationml/2006/main">
+  <p:cSld>
+    <p:spTree>
+      <p:nvGrpSpPr>
+        <p:cNvPr id="1" name=""/>
+        <p:cNvGrpSpPr/>
+        <p:nvPr/>
+      </p:nvGrpSpPr>
+      <p:grpSpPr>
+        <a:xfrm>
+          <a:off x="0" y="0"/>
+          <a:ext cx="0" cy="0"/>
+          <a:chOff x="0" y="0"/>
+          <a:chExt cx="0" cy="0"/>
+        </a:xfrm>
+      </p:grpSpPr>
+      <p:grpSp>
+        <p:nvGrpSpPr>
+          <p:cNvPr id="13" name="Group 12">
+            <a:extLst>
+              <a:ext uri="{FF2B5EF4-FFF2-40B4-BE49-F238E27FC236}">
+                <a16:creationId xmlns:a16="http://schemas.microsoft.com/office/drawing/2014/main" id="{3BD429C2-1880-98F3-84AC-92317A474558}"/>
+              </a:ext>
+            </a:extLst>
+          </p:cNvPr>
+          <p:cNvGrpSpPr/>
+          <p:nvPr/>
+        </p:nvGrpSpPr>
+        <p:grpSpPr>
+          <a:xfrm>
+            <a:off x="652464" y="642505"/>
+            <a:ext cx="2888825" cy="5610117"/>
+            <a:chOff x="652464" y="642505"/>
+            <a:chExt cx="2888825" cy="5610117"/>
+          </a:xfrm>
+        </p:grpSpPr>
+        <p:cxnSp>
+          <p:nvCxnSpPr>
+            <p:cNvPr id="4" name="Straight Connector 3">
+              <a:extLst>
+                <a:ext uri="{FF2B5EF4-FFF2-40B4-BE49-F238E27FC236}">
+                  <a16:creationId xmlns:a16="http://schemas.microsoft.com/office/drawing/2014/main" id="{E3470EE2-195E-3635-F9C1-803A4E2400E6}"/>
+                </a:ext>
+              </a:extLst>
+            </p:cNvPr>
+            <p:cNvCxnSpPr>
+              <a:cxnSpLocks/>
+              <a:stCxn id="19" idx="2"/>
+            </p:cNvCxnSpPr>
+            <p:nvPr/>
+          </p:nvCxnSpPr>
+          <p:spPr>
+            <a:xfrm>
+              <a:off x="2096877" y="3124836"/>
+              <a:ext cx="0" cy="3127786"/>
+            </a:xfrm>
+            <a:prstGeom prst="line">
+              <a:avLst/>
+            </a:prstGeom>
+            <a:ln w="127000">
+              <a:solidFill>
+                <a:schemeClr val="tx1"/>
+              </a:solidFill>
+            </a:ln>
+          </p:spPr>
+          <p:style>
+            <a:lnRef idx="1">
+              <a:schemeClr val="accent1"/>
+            </a:lnRef>
+            <a:fillRef idx="0">
+              <a:schemeClr val="accent1"/>
+            </a:fillRef>
+            <a:effectRef idx="0">
+              <a:schemeClr val="accent1"/>
+            </a:effectRef>
+            <a:fontRef idx="minor">
+              <a:schemeClr val="tx1"/>
+            </a:fontRef>
+          </p:style>
+        </p:cxnSp>
+        <p:cxnSp>
+          <p:nvCxnSpPr>
+            <p:cNvPr id="9" name="Straight Connector 8">
+              <a:extLst>
+                <a:ext uri="{FF2B5EF4-FFF2-40B4-BE49-F238E27FC236}">
+                  <a16:creationId xmlns:a16="http://schemas.microsoft.com/office/drawing/2014/main" id="{91389C9D-BB43-6426-2FFA-BC700FEFF68B}"/>
+                </a:ext>
+              </a:extLst>
+            </p:cNvPr>
+            <p:cNvCxnSpPr>
+              <a:cxnSpLocks/>
+            </p:cNvCxnSpPr>
+            <p:nvPr/>
+          </p:nvCxnSpPr>
+          <p:spPr>
+            <a:xfrm>
+              <a:off x="652464" y="6215494"/>
+              <a:ext cx="2888825" cy="0"/>
+            </a:xfrm>
+            <a:prstGeom prst="line">
+              <a:avLst/>
+            </a:prstGeom>
+            <a:ln w="127000">
+              <a:solidFill>
+                <a:schemeClr val="tx1"/>
+              </a:solidFill>
+            </a:ln>
+          </p:spPr>
+          <p:style>
+            <a:lnRef idx="1">
+              <a:schemeClr val="accent1"/>
+            </a:lnRef>
+            <a:fillRef idx="0">
+              <a:schemeClr val="accent1"/>
+            </a:fillRef>
+            <a:effectRef idx="0">
+              <a:schemeClr val="accent1"/>
+            </a:effectRef>
+            <a:fontRef idx="minor">
+              <a:schemeClr val="tx1"/>
+            </a:fontRef>
+          </p:style>
+        </p:cxnSp>
+        <p:pic>
+          <p:nvPicPr>
+            <p:cNvPr id="19" name="image73.png">
+              <a:extLst>
+                <a:ext uri="{FF2B5EF4-FFF2-40B4-BE49-F238E27FC236}">
+                  <a16:creationId xmlns:a16="http://schemas.microsoft.com/office/drawing/2014/main" id="{E4D7E592-C39A-2EB9-2CD0-45CD97380476}"/>
+                </a:ext>
+              </a:extLst>
+            </p:cNvPr>
+            <p:cNvPicPr>
+              <a:picLocks noChangeAspect="1"/>
+            </p:cNvPicPr>
+            <p:nvPr/>
+          </p:nvPicPr>
+          <p:blipFill>
+            <a:blip r:embed="rId3" cstate="print">
+              <a:extLst>
+                <a:ext uri="{BEBA8EAE-BF5A-486C-A8C5-ECC9F3942E4B}">
+                  <a14:imgProps xmlns:a14="http://schemas.microsoft.com/office/drawing/2010/main">
+                    <a14:imgLayer r:embed="rId4">
+                      <a14:imgEffect>
+                        <a14:sharpenSoften amount="60000"/>
+                      </a14:imgEffect>
+                    </a14:imgLayer>
+                  </a14:imgProps>
+                </a:ext>
+              </a:extLst>
+            </a:blip>
+            <a:stretch>
+              <a:fillRect/>
+            </a:stretch>
+          </p:blipFill>
+          <p:spPr>
+            <a:xfrm>
+              <a:off x="652465" y="642505"/>
+              <a:ext cx="2888824" cy="2482331"/>
+            </a:xfrm>
+            <a:prstGeom prst="rect">
+              <a:avLst/>
+            </a:prstGeom>
+          </p:spPr>
+        </p:pic>
+      </p:grpSp>
+      <p:grpSp>
+        <p:nvGrpSpPr>
+          <p:cNvPr id="29" name="Group 28">
+            <a:extLst>
+              <a:ext uri="{FF2B5EF4-FFF2-40B4-BE49-F238E27FC236}">
+                <a16:creationId xmlns:a16="http://schemas.microsoft.com/office/drawing/2014/main" id="{498BFF7C-976D-B37C-4543-6800E8A141AF}"/>
+              </a:ext>
+            </a:extLst>
+          </p:cNvPr>
+          <p:cNvGrpSpPr/>
+          <p:nvPr/>
+        </p:nvGrpSpPr>
+        <p:grpSpPr>
+          <a:xfrm>
+            <a:off x="4284043" y="646250"/>
+            <a:ext cx="2918205" cy="5565500"/>
+            <a:chOff x="4284043" y="646250"/>
+            <a:chExt cx="2918205" cy="5565500"/>
+          </a:xfrm>
+        </p:grpSpPr>
+        <p:cxnSp>
+          <p:nvCxnSpPr>
+            <p:cNvPr id="17" name="Straight Connector 16">
+              <a:extLst>
+                <a:ext uri="{FF2B5EF4-FFF2-40B4-BE49-F238E27FC236}">
+                  <a16:creationId xmlns:a16="http://schemas.microsoft.com/office/drawing/2014/main" id="{8C4FAD79-C2F5-AA36-F779-98B07386C767}"/>
+                </a:ext>
+              </a:extLst>
+            </p:cNvPr>
+            <p:cNvCxnSpPr>
+              <a:cxnSpLocks/>
+            </p:cNvCxnSpPr>
+            <p:nvPr/>
+          </p:nvCxnSpPr>
+          <p:spPr>
+            <a:xfrm>
+              <a:off x="5741624" y="3054871"/>
+              <a:ext cx="0" cy="3156879"/>
+            </a:xfrm>
+            <a:prstGeom prst="line">
+              <a:avLst/>
+            </a:prstGeom>
+            <a:ln w="127000">
+              <a:solidFill>
+                <a:schemeClr val="tx1"/>
+              </a:solidFill>
+            </a:ln>
+          </p:spPr>
+          <p:style>
+            <a:lnRef idx="1">
+              <a:schemeClr val="accent1"/>
+            </a:lnRef>
+            <a:fillRef idx="0">
+              <a:schemeClr val="accent1"/>
+            </a:fillRef>
+            <a:effectRef idx="0">
+              <a:schemeClr val="accent1"/>
+            </a:effectRef>
+            <a:fontRef idx="minor">
+              <a:schemeClr val="tx1"/>
+            </a:fontRef>
+          </p:style>
+        </p:cxnSp>
+        <p:cxnSp>
+          <p:nvCxnSpPr>
+            <p:cNvPr id="18" name="Straight Connector 17">
+              <a:extLst>
+                <a:ext uri="{FF2B5EF4-FFF2-40B4-BE49-F238E27FC236}">
+                  <a16:creationId xmlns:a16="http://schemas.microsoft.com/office/drawing/2014/main" id="{3B574E9B-56B6-0823-F1BF-51882B1C2C4C}"/>
+                </a:ext>
+              </a:extLst>
+            </p:cNvPr>
+            <p:cNvCxnSpPr>
+              <a:cxnSpLocks/>
+            </p:cNvCxnSpPr>
+            <p:nvPr/>
+          </p:nvCxnSpPr>
+          <p:spPr>
+            <a:xfrm>
+              <a:off x="4297211" y="6174622"/>
+              <a:ext cx="2888825" cy="0"/>
+            </a:xfrm>
+            <a:prstGeom prst="line">
+              <a:avLst/>
+            </a:prstGeom>
+            <a:ln w="127000">
+              <a:solidFill>
+                <a:schemeClr val="tx1"/>
+              </a:solidFill>
+            </a:ln>
+          </p:spPr>
+          <p:style>
+            <a:lnRef idx="1">
+              <a:schemeClr val="accent1"/>
+            </a:lnRef>
+            <a:fillRef idx="0">
+              <a:schemeClr val="accent1"/>
+            </a:fillRef>
+            <a:effectRef idx="0">
+              <a:schemeClr val="accent1"/>
+            </a:effectRef>
+            <a:fontRef idx="minor">
+              <a:schemeClr val="tx1"/>
+            </a:fontRef>
+          </p:style>
+        </p:cxnSp>
+        <p:pic>
+          <p:nvPicPr>
+            <p:cNvPr id="23" name="image67.png">
+              <a:extLst>
+                <a:ext uri="{FF2B5EF4-FFF2-40B4-BE49-F238E27FC236}">
+                  <a16:creationId xmlns:a16="http://schemas.microsoft.com/office/drawing/2014/main" id="{51AEB8A6-8845-93A8-8BBF-D3B54398974A}"/>
+                </a:ext>
+              </a:extLst>
+            </p:cNvPr>
+            <p:cNvPicPr>
+              <a:picLocks noChangeAspect="1"/>
+            </p:cNvPicPr>
+            <p:nvPr/>
+          </p:nvPicPr>
+          <p:blipFill rotWithShape="1">
+            <a:blip r:embed="rId5" cstate="print">
+              <a:clrChange>
+                <a:clrFrom>
+                  <a:srgbClr val="FFFFFF"/>
+                </a:clrFrom>
+                <a:clrTo>
+                  <a:srgbClr val="FFFFFF">
+                    <a:alpha val="0"/>
+                  </a:srgbClr>
+                </a:clrTo>
+              </a:clrChange>
+              <a:extLst>
+                <a:ext uri="{BEBA8EAE-BF5A-486C-A8C5-ECC9F3942E4B}">
+                  <a14:imgProps xmlns:a14="http://schemas.microsoft.com/office/drawing/2010/main">
+                    <a14:imgLayer r:embed="rId6">
+                      <a14:imgEffect>
+                        <a14:sharpenSoften amount="60000"/>
+                      </a14:imgEffect>
+                    </a14:imgLayer>
+                  </a14:imgProps>
+                </a:ext>
+              </a:extLst>
+            </a:blip>
+            <a:srcRect t="1" b="3167"/>
+            <a:stretch/>
+          </p:blipFill>
+          <p:spPr>
+            <a:xfrm>
+              <a:off x="4284043" y="646250"/>
+              <a:ext cx="2918205" cy="2487168"/>
+            </a:xfrm>
+            <a:prstGeom prst="rect">
+              <a:avLst/>
+            </a:prstGeom>
+          </p:spPr>
+        </p:pic>
+      </p:grpSp>
+      <p:grpSp>
+        <p:nvGrpSpPr>
+          <p:cNvPr id="14" name="Group 13">
+            <a:extLst>
+              <a:ext uri="{FF2B5EF4-FFF2-40B4-BE49-F238E27FC236}">
+                <a16:creationId xmlns:a16="http://schemas.microsoft.com/office/drawing/2014/main" id="{080F8F22-8A58-12C0-F5AC-20D684AA2CDD}"/>
+              </a:ext>
+            </a:extLst>
+          </p:cNvPr>
+          <p:cNvGrpSpPr/>
+          <p:nvPr/>
+        </p:nvGrpSpPr>
+        <p:grpSpPr>
+          <a:xfrm>
+            <a:off x="7936329" y="637668"/>
+            <a:ext cx="2894454" cy="5614954"/>
+            <a:chOff x="7936329" y="637668"/>
+            <a:chExt cx="2894454" cy="5614954"/>
+          </a:xfrm>
+        </p:grpSpPr>
+        <p:cxnSp>
+          <p:nvCxnSpPr>
+            <p:cNvPr id="21" name="Straight Connector 20">
+              <a:extLst>
+                <a:ext uri="{FF2B5EF4-FFF2-40B4-BE49-F238E27FC236}">
+                  <a16:creationId xmlns:a16="http://schemas.microsoft.com/office/drawing/2014/main" id="{5A8D03DD-E69F-25D0-695C-F89496E2A4CF}"/>
+                </a:ext>
+              </a:extLst>
+            </p:cNvPr>
+            <p:cNvCxnSpPr>
+              <a:cxnSpLocks/>
+            </p:cNvCxnSpPr>
+            <p:nvPr/>
+          </p:nvCxnSpPr>
+          <p:spPr>
+            <a:xfrm>
+              <a:off x="9386371" y="3095743"/>
+              <a:ext cx="0" cy="3156879"/>
+            </a:xfrm>
+            <a:prstGeom prst="line">
+              <a:avLst/>
+            </a:prstGeom>
+            <a:ln w="127000">
+              <a:solidFill>
+                <a:schemeClr val="tx1"/>
+              </a:solidFill>
+            </a:ln>
+          </p:spPr>
+          <p:style>
+            <a:lnRef idx="1">
+              <a:schemeClr val="accent1"/>
+            </a:lnRef>
+            <a:fillRef idx="0">
+              <a:schemeClr val="accent1"/>
+            </a:fillRef>
+            <a:effectRef idx="0">
+              <a:schemeClr val="accent1"/>
+            </a:effectRef>
+            <a:fontRef idx="minor">
+              <a:schemeClr val="tx1"/>
+            </a:fontRef>
+          </p:style>
+        </p:cxnSp>
+        <p:cxnSp>
+          <p:nvCxnSpPr>
+            <p:cNvPr id="22" name="Straight Connector 21">
+              <a:extLst>
+                <a:ext uri="{FF2B5EF4-FFF2-40B4-BE49-F238E27FC236}">
+                  <a16:creationId xmlns:a16="http://schemas.microsoft.com/office/drawing/2014/main" id="{D500EBA2-C067-76BD-6150-FC2CF87E32AE}"/>
+                </a:ext>
+              </a:extLst>
+            </p:cNvPr>
+            <p:cNvCxnSpPr>
+              <a:cxnSpLocks/>
+            </p:cNvCxnSpPr>
+            <p:nvPr/>
+          </p:nvCxnSpPr>
+          <p:spPr>
+            <a:xfrm>
+              <a:off x="7941958" y="6215494"/>
+              <a:ext cx="2888825" cy="0"/>
+            </a:xfrm>
+            <a:prstGeom prst="line">
+              <a:avLst/>
+            </a:prstGeom>
+            <a:ln w="127000">
+              <a:solidFill>
+                <a:schemeClr val="tx1"/>
+              </a:solidFill>
+            </a:ln>
+          </p:spPr>
+          <p:style>
+            <a:lnRef idx="1">
+              <a:schemeClr val="accent1"/>
+            </a:lnRef>
+            <a:fillRef idx="0">
+              <a:schemeClr val="accent1"/>
+            </a:fillRef>
+            <a:effectRef idx="0">
+              <a:schemeClr val="accent1"/>
+            </a:effectRef>
+            <a:fontRef idx="minor">
+              <a:schemeClr val="tx1"/>
+            </a:fontRef>
+          </p:style>
+        </p:cxnSp>
+        <p:pic>
+          <p:nvPicPr>
+            <p:cNvPr id="28" name="image10.png">
+              <a:extLst>
+                <a:ext uri="{FF2B5EF4-FFF2-40B4-BE49-F238E27FC236}">
+                  <a16:creationId xmlns:a16="http://schemas.microsoft.com/office/drawing/2014/main" id="{7D3B3CBD-31D8-1972-1401-BF5A709F6EA2}"/>
+                </a:ext>
+              </a:extLst>
+            </p:cNvPr>
+            <p:cNvPicPr>
+              <a:picLocks noChangeAspect="1"/>
+            </p:cNvPicPr>
+            <p:nvPr/>
+          </p:nvPicPr>
+          <p:blipFill>
+            <a:blip r:embed="rId7" cstate="print">
+              <a:extLst>
+                <a:ext uri="{BEBA8EAE-BF5A-486C-A8C5-ECC9F3942E4B}">
+                  <a14:imgProps xmlns:a14="http://schemas.microsoft.com/office/drawing/2010/main">
+                    <a14:imgLayer r:embed="rId8">
+                      <a14:imgEffect>
+                        <a14:sharpenSoften amount="60000"/>
+                      </a14:imgEffect>
+                    </a14:imgLayer>
+                  </a14:imgProps>
+                </a:ext>
+              </a:extLst>
+            </a:blip>
+            <a:stretch>
+              <a:fillRect/>
+            </a:stretch>
+          </p:blipFill>
+          <p:spPr>
+            <a:xfrm>
+              <a:off x="7936329" y="637668"/>
+              <a:ext cx="2894452" cy="2487168"/>
+            </a:xfrm>
+            <a:prstGeom prst="rect">
+              <a:avLst/>
+            </a:prstGeom>
+          </p:spPr>
+        </p:pic>
+      </p:grpSp>
+    </p:spTree>
+    <p:extLst>
+      <p:ext uri="{BB962C8B-B14F-4D97-AF65-F5344CB8AC3E}">
+        <p14:creationId xmlns:p14="http://schemas.microsoft.com/office/powerpoint/2010/main" val="2241026597"/>
+      </p:ext>
+    </p:extLst>
+  </p:cSld>
+  <p:clrMapOvr>
+    <a:masterClrMapping/>
+  </p:clrMapOvr>
+</p:sld>
+</file>
+
+<file path=ppt/slides/slide4.xml><?xml version="1.0" encoding="utf-8"?>
+<p:sld xmlns:a="http://schemas.openxmlformats.org/drawingml/2006/main" xmlns:r="http://schemas.openxmlformats.org/officeDocument/2006/relationships" xmlns:p="http://schemas.openxmlformats.org/presentationml/2006/main">
+  <p:cSld>
+    <p:spTree>
+      <p:nvGrpSpPr>
+        <p:cNvPr id="1" name=""/>
+        <p:cNvGrpSpPr/>
+        <p:nvPr/>
+      </p:nvGrpSpPr>
+      <p:grpSpPr>
+        <a:xfrm>
+          <a:off x="0" y="0"/>
+          <a:ext cx="0" cy="0"/>
+          <a:chOff x="0" y="0"/>
+          <a:chExt cx="0" cy="0"/>
+        </a:xfrm>
+      </p:grpSpPr>
+      <p:grpSp>
+        <p:nvGrpSpPr>
+          <p:cNvPr id="40" name="Group 39">
+            <a:extLst>
+              <a:ext uri="{FF2B5EF4-FFF2-40B4-BE49-F238E27FC236}">
+                <a16:creationId xmlns:a16="http://schemas.microsoft.com/office/drawing/2014/main" id="{BAA5EA69-F597-C3DB-888C-D67C796FAB9A}"/>
+              </a:ext>
+            </a:extLst>
+          </p:cNvPr>
+          <p:cNvGrpSpPr/>
+          <p:nvPr/>
+        </p:nvGrpSpPr>
+        <p:grpSpPr>
+          <a:xfrm>
+            <a:off x="652464" y="642505"/>
+            <a:ext cx="2894452" cy="5610117"/>
+            <a:chOff x="652464" y="642505"/>
+            <a:chExt cx="2894452" cy="5610117"/>
+          </a:xfrm>
+        </p:grpSpPr>
+        <p:cxnSp>
+          <p:nvCxnSpPr>
+            <p:cNvPr id="4" name="Straight Connector 3">
+              <a:extLst>
+                <a:ext uri="{FF2B5EF4-FFF2-40B4-BE49-F238E27FC236}">
+                  <a16:creationId xmlns:a16="http://schemas.microsoft.com/office/drawing/2014/main" id="{E3470EE2-195E-3635-F9C1-803A4E2400E6}"/>
+                </a:ext>
+              </a:extLst>
+            </p:cNvPr>
+            <p:cNvCxnSpPr>
+              <a:cxnSpLocks/>
+            </p:cNvCxnSpPr>
+            <p:nvPr/>
+          </p:nvCxnSpPr>
+          <p:spPr>
+            <a:xfrm>
+              <a:off x="2096877" y="3095743"/>
+              <a:ext cx="0" cy="3156879"/>
+            </a:xfrm>
+            <a:prstGeom prst="line">
+              <a:avLst/>
+            </a:prstGeom>
+            <a:ln w="127000">
+              <a:solidFill>
+                <a:schemeClr val="tx1"/>
+              </a:solidFill>
+            </a:ln>
+          </p:spPr>
+          <p:style>
+            <a:lnRef idx="1">
+              <a:schemeClr val="accent1"/>
+            </a:lnRef>
+            <a:fillRef idx="0">
+              <a:schemeClr val="accent1"/>
+            </a:fillRef>
+            <a:effectRef idx="0">
+              <a:schemeClr val="accent1"/>
+            </a:effectRef>
+            <a:fontRef idx="minor">
+              <a:schemeClr val="tx1"/>
+            </a:fontRef>
+          </p:style>
+        </p:cxnSp>
+        <p:cxnSp>
+          <p:nvCxnSpPr>
+            <p:cNvPr id="9" name="Straight Connector 8">
+              <a:extLst>
+                <a:ext uri="{FF2B5EF4-FFF2-40B4-BE49-F238E27FC236}">
+                  <a16:creationId xmlns:a16="http://schemas.microsoft.com/office/drawing/2014/main" id="{91389C9D-BB43-6426-2FFA-BC700FEFF68B}"/>
+                </a:ext>
+              </a:extLst>
+            </p:cNvPr>
+            <p:cNvCxnSpPr>
+              <a:cxnSpLocks/>
+            </p:cNvCxnSpPr>
+            <p:nvPr/>
+          </p:nvCxnSpPr>
+          <p:spPr>
+            <a:xfrm>
+              <a:off x="652464" y="6215494"/>
+              <a:ext cx="2888825" cy="0"/>
+            </a:xfrm>
+            <a:prstGeom prst="line">
+              <a:avLst/>
+            </a:prstGeom>
+            <a:ln w="127000">
+              <a:solidFill>
+                <a:schemeClr val="tx1"/>
+              </a:solidFill>
+            </a:ln>
+          </p:spPr>
+          <p:style>
+            <a:lnRef idx="1">
+              <a:schemeClr val="accent1"/>
+            </a:lnRef>
+            <a:fillRef idx="0">
+              <a:schemeClr val="accent1"/>
+            </a:fillRef>
+            <a:effectRef idx="0">
+              <a:schemeClr val="accent1"/>
+            </a:effectRef>
+            <a:fontRef idx="minor">
+              <a:schemeClr val="tx1"/>
+            </a:fontRef>
+          </p:style>
+        </p:cxnSp>
+        <p:pic>
+          <p:nvPicPr>
+            <p:cNvPr id="36" name="image8.png">
+              <a:extLst>
+                <a:ext uri="{FF2B5EF4-FFF2-40B4-BE49-F238E27FC236}">
+                  <a16:creationId xmlns:a16="http://schemas.microsoft.com/office/drawing/2014/main" id="{C3CE77B6-92FB-944A-F89A-DEB1A187D3F1}"/>
+                </a:ext>
+              </a:extLst>
+            </p:cNvPr>
+            <p:cNvPicPr>
+              <a:picLocks noChangeAspect="1"/>
+            </p:cNvPicPr>
+            <p:nvPr/>
+          </p:nvPicPr>
+          <p:blipFill>
+            <a:blip r:embed="rId2" cstate="print"/>
+            <a:stretch>
+              <a:fillRect/>
+            </a:stretch>
+          </p:blipFill>
+          <p:spPr>
+            <a:xfrm>
+              <a:off x="652464" y="642505"/>
+              <a:ext cx="2894452" cy="2487168"/>
+            </a:xfrm>
+            <a:prstGeom prst="rect">
+              <a:avLst/>
+            </a:prstGeom>
+          </p:spPr>
+        </p:pic>
+      </p:grpSp>
+      <p:grpSp>
+        <p:nvGrpSpPr>
+          <p:cNvPr id="41" name="Group 40">
+            <a:extLst>
+              <a:ext uri="{FF2B5EF4-FFF2-40B4-BE49-F238E27FC236}">
+                <a16:creationId xmlns:a16="http://schemas.microsoft.com/office/drawing/2014/main" id="{8304C809-1827-DB23-05BA-869638FB5ED6}"/>
+              </a:ext>
+            </a:extLst>
+          </p:cNvPr>
+          <p:cNvGrpSpPr/>
+          <p:nvPr/>
+        </p:nvGrpSpPr>
+        <p:grpSpPr>
+          <a:xfrm>
+            <a:off x="8430808" y="642505"/>
+            <a:ext cx="2888825" cy="5569246"/>
+            <a:chOff x="8430808" y="642505"/>
+            <a:chExt cx="2888825" cy="5569246"/>
+          </a:xfrm>
+        </p:grpSpPr>
+        <p:cxnSp>
+          <p:nvCxnSpPr>
+            <p:cNvPr id="25" name="Straight Connector 24">
+              <a:extLst>
+                <a:ext uri="{FF2B5EF4-FFF2-40B4-BE49-F238E27FC236}">
+                  <a16:creationId xmlns:a16="http://schemas.microsoft.com/office/drawing/2014/main" id="{2E53FFD2-741D-5531-E02C-2DA456E8140D}"/>
+                </a:ext>
+              </a:extLst>
+            </p:cNvPr>
+            <p:cNvCxnSpPr>
+              <a:cxnSpLocks/>
+              <a:stCxn id="37" idx="2"/>
+            </p:cNvCxnSpPr>
+            <p:nvPr/>
+          </p:nvCxnSpPr>
+          <p:spPr>
+            <a:xfrm>
+              <a:off x="9905012" y="3129673"/>
+              <a:ext cx="0" cy="3044950"/>
+            </a:xfrm>
+            <a:prstGeom prst="line">
+              <a:avLst/>
+            </a:prstGeom>
+            <a:ln w="127000">
+              <a:solidFill>
+                <a:schemeClr val="tx1"/>
+              </a:solidFill>
+            </a:ln>
+          </p:spPr>
+          <p:style>
+            <a:lnRef idx="1">
+              <a:schemeClr val="accent1"/>
+            </a:lnRef>
+            <a:fillRef idx="0">
+              <a:schemeClr val="accent1"/>
+            </a:fillRef>
+            <a:effectRef idx="0">
+              <a:schemeClr val="accent1"/>
+            </a:effectRef>
+            <a:fontRef idx="minor">
+              <a:schemeClr val="tx1"/>
+            </a:fontRef>
+          </p:style>
+        </p:cxnSp>
+        <p:cxnSp>
+          <p:nvCxnSpPr>
+            <p:cNvPr id="26" name="Straight Connector 25">
+              <a:extLst>
+                <a:ext uri="{FF2B5EF4-FFF2-40B4-BE49-F238E27FC236}">
+                  <a16:creationId xmlns:a16="http://schemas.microsoft.com/office/drawing/2014/main" id="{39A96733-311C-B7D8-AC93-2E9A5C58CB22}"/>
+                </a:ext>
+              </a:extLst>
+            </p:cNvPr>
+            <p:cNvCxnSpPr>
+              <a:cxnSpLocks/>
+            </p:cNvCxnSpPr>
+            <p:nvPr/>
+          </p:nvCxnSpPr>
+          <p:spPr>
+            <a:xfrm>
+              <a:off x="8430808" y="6211751"/>
+              <a:ext cx="2888825" cy="0"/>
+            </a:xfrm>
+            <a:prstGeom prst="line">
+              <a:avLst/>
+            </a:prstGeom>
+            <a:ln w="127000">
+              <a:solidFill>
+                <a:schemeClr val="tx1"/>
+              </a:solidFill>
+            </a:ln>
+          </p:spPr>
+          <p:style>
+            <a:lnRef idx="1">
+              <a:schemeClr val="accent1"/>
+            </a:lnRef>
+            <a:fillRef idx="0">
+              <a:schemeClr val="accent1"/>
+            </a:fillRef>
+            <a:effectRef idx="0">
+              <a:schemeClr val="accent1"/>
+            </a:effectRef>
+            <a:fontRef idx="minor">
+              <a:schemeClr val="tx1"/>
+            </a:fontRef>
+          </p:style>
+        </p:cxnSp>
+        <p:pic>
+          <p:nvPicPr>
+            <p:cNvPr id="37" name="image9.png">
+              <a:extLst>
+                <a:ext uri="{FF2B5EF4-FFF2-40B4-BE49-F238E27FC236}">
+                  <a16:creationId xmlns:a16="http://schemas.microsoft.com/office/drawing/2014/main" id="{70B29EEA-88FA-8E7D-A8C7-11498E1EFE3F}"/>
+                </a:ext>
+              </a:extLst>
+            </p:cNvPr>
+            <p:cNvPicPr>
+              <a:picLocks noChangeAspect="1"/>
+            </p:cNvPicPr>
+            <p:nvPr/>
+          </p:nvPicPr>
+          <p:blipFill>
+            <a:blip r:embed="rId3" cstate="print">
+              <a:extLst>
+                <a:ext uri="{BEBA8EAE-BF5A-486C-A8C5-ECC9F3942E4B}">
+                  <a14:imgProps xmlns:a14="http://schemas.microsoft.com/office/drawing/2010/main">
+                    <a14:imgLayer r:embed="rId4">
+                      <a14:imgEffect>
+                        <a14:sharpenSoften amount="60000"/>
+                      </a14:imgEffect>
+                      <a14:imgEffect>
+                        <a14:saturation sat="400000"/>
+                      </a14:imgEffect>
+                    </a14:imgLayer>
+                  </a14:imgProps>
+                </a:ext>
+              </a:extLst>
+            </a:blip>
+            <a:stretch>
+              <a:fillRect/>
+            </a:stretch>
+          </p:blipFill>
+          <p:spPr>
+            <a:xfrm>
+              <a:off x="8661428" y="642505"/>
+              <a:ext cx="2487168" cy="2487168"/>
+            </a:xfrm>
+            <a:prstGeom prst="rect">
+              <a:avLst/>
+            </a:prstGeom>
+          </p:spPr>
+        </p:pic>
+      </p:grpSp>
+      <p:grpSp>
+        <p:nvGrpSpPr>
+          <p:cNvPr id="45" name="Group 44">
+            <a:extLst>
+              <a:ext uri="{FF2B5EF4-FFF2-40B4-BE49-F238E27FC236}">
+                <a16:creationId xmlns:a16="http://schemas.microsoft.com/office/drawing/2014/main" id="{C2183C59-0167-3BC5-8CAE-AD681CA3A061}"/>
+              </a:ext>
+            </a:extLst>
+          </p:cNvPr>
+          <p:cNvGrpSpPr/>
+          <p:nvPr/>
+        </p:nvGrpSpPr>
+        <p:grpSpPr>
+          <a:xfrm>
+            <a:off x="4297211" y="642505"/>
+            <a:ext cx="2888825" cy="5569246"/>
+            <a:chOff x="4297211" y="642505"/>
+            <a:chExt cx="2888825" cy="5569246"/>
+          </a:xfrm>
+        </p:grpSpPr>
+        <p:cxnSp>
+          <p:nvCxnSpPr>
+            <p:cNvPr id="17" name="Straight Connector 16">
+              <a:extLst>
+                <a:ext uri="{FF2B5EF4-FFF2-40B4-BE49-F238E27FC236}">
+                  <a16:creationId xmlns:a16="http://schemas.microsoft.com/office/drawing/2014/main" id="{8C4FAD79-C2F5-AA36-F779-98B07386C767}"/>
+                </a:ext>
+              </a:extLst>
+            </p:cNvPr>
+            <p:cNvCxnSpPr>
+              <a:cxnSpLocks/>
+              <a:stCxn id="39" idx="2"/>
+            </p:cNvCxnSpPr>
+            <p:nvPr/>
+          </p:nvCxnSpPr>
+          <p:spPr>
+            <a:xfrm>
+              <a:off x="5741623" y="3138817"/>
+              <a:ext cx="1" cy="3072934"/>
+            </a:xfrm>
+            <a:prstGeom prst="line">
+              <a:avLst/>
+            </a:prstGeom>
+            <a:ln w="127000">
+              <a:solidFill>
+                <a:schemeClr val="tx1"/>
+              </a:solidFill>
+            </a:ln>
+          </p:spPr>
+          <p:style>
+            <a:lnRef idx="1">
+              <a:schemeClr val="accent1"/>
+            </a:lnRef>
+            <a:fillRef idx="0">
+              <a:schemeClr val="accent1"/>
+            </a:fillRef>
+            <a:effectRef idx="0">
+              <a:schemeClr val="accent1"/>
+            </a:effectRef>
+            <a:fontRef idx="minor">
+              <a:schemeClr val="tx1"/>
+            </a:fontRef>
+          </p:style>
+        </p:cxnSp>
+        <p:cxnSp>
+          <p:nvCxnSpPr>
+            <p:cNvPr id="18" name="Straight Connector 17">
+              <a:extLst>
+                <a:ext uri="{FF2B5EF4-FFF2-40B4-BE49-F238E27FC236}">
+                  <a16:creationId xmlns:a16="http://schemas.microsoft.com/office/drawing/2014/main" id="{3B574E9B-56B6-0823-F1BF-51882B1C2C4C}"/>
+                </a:ext>
+              </a:extLst>
+            </p:cNvPr>
+            <p:cNvCxnSpPr>
+              <a:cxnSpLocks/>
+            </p:cNvCxnSpPr>
+            <p:nvPr/>
+          </p:nvCxnSpPr>
+          <p:spPr>
+            <a:xfrm>
+              <a:off x="4297211" y="6174623"/>
+              <a:ext cx="2888825" cy="0"/>
+            </a:xfrm>
+            <a:prstGeom prst="line">
+              <a:avLst/>
+            </a:prstGeom>
+            <a:ln w="127000">
+              <a:solidFill>
+                <a:schemeClr val="tx1"/>
+              </a:solidFill>
+            </a:ln>
+          </p:spPr>
+          <p:style>
+            <a:lnRef idx="1">
+              <a:schemeClr val="accent1"/>
+            </a:lnRef>
+            <a:fillRef idx="0">
+              <a:schemeClr val="accent1"/>
+            </a:fillRef>
+            <a:effectRef idx="0">
+              <a:schemeClr val="accent1"/>
+            </a:effectRef>
+            <a:fontRef idx="minor">
+              <a:schemeClr val="tx1"/>
+            </a:fontRef>
+          </p:style>
+        </p:cxnSp>
+        <p:pic>
+          <p:nvPicPr>
+            <p:cNvPr id="39" name="image60.png">
+              <a:extLst>
+                <a:ext uri="{FF2B5EF4-FFF2-40B4-BE49-F238E27FC236}">
+                  <a16:creationId xmlns:a16="http://schemas.microsoft.com/office/drawing/2014/main" id="{5E594051-A51D-A7AC-106F-06304A454075}"/>
+                </a:ext>
+              </a:extLst>
+            </p:cNvPr>
+            <p:cNvPicPr>
+              <a:picLocks noChangeAspect="1"/>
+            </p:cNvPicPr>
+            <p:nvPr/>
+          </p:nvPicPr>
+          <p:blipFill>
+            <a:blip r:embed="rId5" cstate="print"/>
+            <a:stretch>
+              <a:fillRect/>
+            </a:stretch>
+          </p:blipFill>
+          <p:spPr>
+            <a:xfrm>
+              <a:off x="4493467" y="642505"/>
+              <a:ext cx="2496312" cy="2496312"/>
+            </a:xfrm>
+            <a:prstGeom prst="rect">
+              <a:avLst/>
+            </a:prstGeom>
+          </p:spPr>
+        </p:pic>
+      </p:grpSp>
+    </p:spTree>
+    <p:extLst>
+      <p:ext uri="{BB962C8B-B14F-4D97-AF65-F5344CB8AC3E}">
+        <p14:creationId xmlns:p14="http://schemas.microsoft.com/office/powerpoint/2010/main" val="209112891"/>
       </p:ext>
     </p:extLst>
   </p:cSld>

</xml_diff>